<commit_message>
Add Cowboys Cigarettes Case Study
</commit_message>
<xml_diff>
--- a/Story_from_a_Dataset/Nobel_prizes.pptx
+++ b/Story_from_a_Dataset/Nobel_prizes.pptx
@@ -148,7 +148,7 @@
   <pc:docChgLst>
     <pc:chgData name="Javier Nuno Tapia" userId="c12b1722a1685bec" providerId="LiveId" clId="{340A0844-BD55-439C-B463-383BDE55547E}"/>
     <pc:docChg chg="custSel addSld delSld modSld">
-      <pc:chgData name="Javier Nuno Tapia" userId="c12b1722a1685bec" providerId="LiveId" clId="{340A0844-BD55-439C-B463-383BDE55547E}" dt="2020-11-17T22:06:08.797" v="277" actId="20577"/>
+      <pc:chgData name="Javier Nuno Tapia" userId="c12b1722a1685bec" providerId="LiveId" clId="{340A0844-BD55-439C-B463-383BDE55547E}" dt="2020-11-19T01:29:46.137" v="279" actId="313"/>
       <pc:docMkLst>
         <pc:docMk/>
       </pc:docMkLst>
@@ -359,7 +359,7 @@
         </pc:picChg>
       </pc:sldChg>
       <pc:sldChg chg="addSp delSp modSp new mod">
-        <pc:chgData name="Javier Nuno Tapia" userId="c12b1722a1685bec" providerId="LiveId" clId="{340A0844-BD55-439C-B463-383BDE55547E}" dt="2020-11-17T21:55:03.079" v="175" actId="122"/>
+        <pc:chgData name="Javier Nuno Tapia" userId="c12b1722a1685bec" providerId="LiveId" clId="{340A0844-BD55-439C-B463-383BDE55547E}" dt="2020-11-19T01:29:46.137" v="279" actId="313"/>
         <pc:sldMkLst>
           <pc:docMk/>
           <pc:sldMk cId="3737458814" sldId="269"/>
@@ -381,7 +381,7 @@
           </ac:spMkLst>
         </pc:spChg>
         <pc:spChg chg="add mod">
-          <ac:chgData name="Javier Nuno Tapia" userId="c12b1722a1685bec" providerId="LiveId" clId="{340A0844-BD55-439C-B463-383BDE55547E}" dt="2020-11-17T21:55:03.079" v="175" actId="122"/>
+          <ac:chgData name="Javier Nuno Tapia" userId="c12b1722a1685bec" providerId="LiveId" clId="{340A0844-BD55-439C-B463-383BDE55547E}" dt="2020-11-19T01:29:46.137" v="279" actId="313"/>
           <ac:spMkLst>
             <pc:docMk/>
             <pc:sldMk cId="3737458814" sldId="269"/>
@@ -541,7 +541,7 @@
           <a:p>
             <a:fld id="{5BEC3377-4292-4814-913F-3B0207C2C037}" type="datetimeFigureOut">
               <a:rPr lang="en-US" smtClean="0"/>
-              <a:t>11/17/2020</a:t>
+              <a:t>11/18/2020</a:t>
             </a:fld>
             <a:endParaRPr lang="en-US"/>
           </a:p>
@@ -739,7 +739,7 @@
           <a:p>
             <a:fld id="{5BEC3377-4292-4814-913F-3B0207C2C037}" type="datetimeFigureOut">
               <a:rPr lang="en-US" smtClean="0"/>
-              <a:t>11/17/2020</a:t>
+              <a:t>11/18/2020</a:t>
             </a:fld>
             <a:endParaRPr lang="en-US"/>
           </a:p>
@@ -947,7 +947,7 @@
           <a:p>
             <a:fld id="{5BEC3377-4292-4814-913F-3B0207C2C037}" type="datetimeFigureOut">
               <a:rPr lang="en-US" smtClean="0"/>
-              <a:t>11/17/2020</a:t>
+              <a:t>11/18/2020</a:t>
             </a:fld>
             <a:endParaRPr lang="en-US"/>
           </a:p>
@@ -1145,7 +1145,7 @@
           <a:p>
             <a:fld id="{5BEC3377-4292-4814-913F-3B0207C2C037}" type="datetimeFigureOut">
               <a:rPr lang="en-US" smtClean="0"/>
-              <a:t>11/17/2020</a:t>
+              <a:t>11/18/2020</a:t>
             </a:fld>
             <a:endParaRPr lang="en-US"/>
           </a:p>
@@ -1420,7 +1420,7 @@
           <a:p>
             <a:fld id="{5BEC3377-4292-4814-913F-3B0207C2C037}" type="datetimeFigureOut">
               <a:rPr lang="en-US" smtClean="0"/>
-              <a:t>11/17/2020</a:t>
+              <a:t>11/18/2020</a:t>
             </a:fld>
             <a:endParaRPr lang="en-US"/>
           </a:p>
@@ -1685,7 +1685,7 @@
           <a:p>
             <a:fld id="{5BEC3377-4292-4814-913F-3B0207C2C037}" type="datetimeFigureOut">
               <a:rPr lang="en-US" smtClean="0"/>
-              <a:t>11/17/2020</a:t>
+              <a:t>11/18/2020</a:t>
             </a:fld>
             <a:endParaRPr lang="en-US"/>
           </a:p>
@@ -2097,7 +2097,7 @@
           <a:p>
             <a:fld id="{5BEC3377-4292-4814-913F-3B0207C2C037}" type="datetimeFigureOut">
               <a:rPr lang="en-US" smtClean="0"/>
-              <a:t>11/17/2020</a:t>
+              <a:t>11/18/2020</a:t>
             </a:fld>
             <a:endParaRPr lang="en-US"/>
           </a:p>
@@ -2238,7 +2238,7 @@
           <a:p>
             <a:fld id="{5BEC3377-4292-4814-913F-3B0207C2C037}" type="datetimeFigureOut">
               <a:rPr lang="en-US" smtClean="0"/>
-              <a:t>11/17/2020</a:t>
+              <a:t>11/18/2020</a:t>
             </a:fld>
             <a:endParaRPr lang="en-US"/>
           </a:p>
@@ -2351,7 +2351,7 @@
           <a:p>
             <a:fld id="{5BEC3377-4292-4814-913F-3B0207C2C037}" type="datetimeFigureOut">
               <a:rPr lang="en-US" smtClean="0"/>
-              <a:t>11/17/2020</a:t>
+              <a:t>11/18/2020</a:t>
             </a:fld>
             <a:endParaRPr lang="en-US"/>
           </a:p>
@@ -2662,7 +2662,7 @@
           <a:p>
             <a:fld id="{5BEC3377-4292-4814-913F-3B0207C2C037}" type="datetimeFigureOut">
               <a:rPr lang="en-US" smtClean="0"/>
-              <a:t>11/17/2020</a:t>
+              <a:t>11/18/2020</a:t>
             </a:fld>
             <a:endParaRPr lang="en-US"/>
           </a:p>
@@ -2950,7 +2950,7 @@
           <a:p>
             <a:fld id="{5BEC3377-4292-4814-913F-3B0207C2C037}" type="datetimeFigureOut">
               <a:rPr lang="en-US" smtClean="0"/>
-              <a:t>11/17/2020</a:t>
+              <a:t>11/18/2020</a:t>
             </a:fld>
             <a:endParaRPr lang="en-US"/>
           </a:p>
@@ -3191,7 +3191,7 @@
           <a:p>
             <a:fld id="{5BEC3377-4292-4814-913F-3B0207C2C037}" type="datetimeFigureOut">
               <a:rPr lang="en-US" smtClean="0"/>
-              <a:t>11/17/2020</a:t>
+              <a:t>11/18/2020</a:t>
             </a:fld>
             <a:endParaRPr lang="en-US"/>
           </a:p>
@@ -4006,7 +4006,7 @@
             </a:pPr>
             <a:r>
               <a:rPr lang="en-US" sz="4800" b="1" dirty="0"/>
-              <a:t>The USA has massively benefited from scientific immigration. </a:t>
+              <a:t>The USA has massively benefited from Scientifics immigration. </a:t>
             </a:r>
           </a:p>
         </p:txBody>

</xml_diff>